<commit_message>
ML prez on accuracy
</commit_message>
<xml_diff>
--- a/Presentations/ML Dataset Preparation.pptx
+++ b/Presentations/ML Dataset Preparation.pptx
@@ -207,7 +207,7 @@
           <a:p>
             <a:fld id="{3D107EA7-2171-4F44-8749-7588FC3178D8}" type="datetimeFigureOut">
               <a:rPr lang="en-US" smtClean="0"/>
-              <a:t>7/6/2017</a:t>
+              <a:t>7/12/2017</a:t>
             </a:fld>
             <a:endParaRPr lang="en-US"/>
           </a:p>
@@ -993,7 +993,7 @@
             <a:fld id="{1D8BD707-D9CF-40AE-B4C6-C98DA3205C09}" type="datetimeFigureOut">
               <a:rPr lang="en-US" smtClean="0"/>
               <a:pPr/>
-              <a:t>7/6/2017</a:t>
+              <a:t>7/12/2017</a:t>
             </a:fld>
             <a:endParaRPr lang="en-US"/>
           </a:p>
@@ -1160,7 +1160,7 @@
             <a:fld id="{1D8BD707-D9CF-40AE-B4C6-C98DA3205C09}" type="datetimeFigureOut">
               <a:rPr lang="en-US" smtClean="0"/>
               <a:pPr/>
-              <a:t>7/6/2017</a:t>
+              <a:t>7/12/2017</a:t>
             </a:fld>
             <a:endParaRPr lang="en-US"/>
           </a:p>
@@ -1337,7 +1337,7 @@
             <a:fld id="{1D8BD707-D9CF-40AE-B4C6-C98DA3205C09}" type="datetimeFigureOut">
               <a:rPr lang="en-US" smtClean="0"/>
               <a:pPr/>
-              <a:t>7/6/2017</a:t>
+              <a:t>7/12/2017</a:t>
             </a:fld>
             <a:endParaRPr lang="en-US"/>
           </a:p>
@@ -1504,7 +1504,7 @@
             <a:fld id="{1D8BD707-D9CF-40AE-B4C6-C98DA3205C09}" type="datetimeFigureOut">
               <a:rPr lang="en-US" smtClean="0"/>
               <a:pPr/>
-              <a:t>7/6/2017</a:t>
+              <a:t>7/12/2017</a:t>
             </a:fld>
             <a:endParaRPr lang="en-US"/>
           </a:p>
@@ -1747,7 +1747,7 @@
             <a:fld id="{1D8BD707-D9CF-40AE-B4C6-C98DA3205C09}" type="datetimeFigureOut">
               <a:rPr lang="en-US" smtClean="0"/>
               <a:pPr/>
-              <a:t>7/6/2017</a:t>
+              <a:t>7/12/2017</a:t>
             </a:fld>
             <a:endParaRPr lang="en-US"/>
           </a:p>
@@ -2032,7 +2032,7 @@
             <a:fld id="{1D8BD707-D9CF-40AE-B4C6-C98DA3205C09}" type="datetimeFigureOut">
               <a:rPr lang="en-US" smtClean="0"/>
               <a:pPr/>
-              <a:t>7/6/2017</a:t>
+              <a:t>7/12/2017</a:t>
             </a:fld>
             <a:endParaRPr lang="en-US"/>
           </a:p>
@@ -2451,7 +2451,7 @@
             <a:fld id="{1D8BD707-D9CF-40AE-B4C6-C98DA3205C09}" type="datetimeFigureOut">
               <a:rPr lang="en-US" smtClean="0"/>
               <a:pPr/>
-              <a:t>7/6/2017</a:t>
+              <a:t>7/12/2017</a:t>
             </a:fld>
             <a:endParaRPr lang="en-US"/>
           </a:p>
@@ -2566,7 +2566,7 @@
             <a:fld id="{1D8BD707-D9CF-40AE-B4C6-C98DA3205C09}" type="datetimeFigureOut">
               <a:rPr lang="en-US" smtClean="0"/>
               <a:pPr/>
-              <a:t>7/6/2017</a:t>
+              <a:t>7/12/2017</a:t>
             </a:fld>
             <a:endParaRPr lang="en-US"/>
           </a:p>
@@ -2658,7 +2658,7 @@
             <a:fld id="{1D8BD707-D9CF-40AE-B4C6-C98DA3205C09}" type="datetimeFigureOut">
               <a:rPr lang="en-US" smtClean="0"/>
               <a:pPr/>
-              <a:t>7/6/2017</a:t>
+              <a:t>7/12/2017</a:t>
             </a:fld>
             <a:endParaRPr lang="en-US"/>
           </a:p>
@@ -2932,7 +2932,7 @@
             <a:fld id="{1D8BD707-D9CF-40AE-B4C6-C98DA3205C09}" type="datetimeFigureOut">
               <a:rPr lang="en-US" smtClean="0"/>
               <a:pPr/>
-              <a:t>7/6/2017</a:t>
+              <a:t>7/12/2017</a:t>
             </a:fld>
             <a:endParaRPr lang="en-US"/>
           </a:p>
@@ -3182,7 +3182,7 @@
             <a:fld id="{1D8BD707-D9CF-40AE-B4C6-C98DA3205C09}" type="datetimeFigureOut">
               <a:rPr lang="en-US" smtClean="0"/>
               <a:pPr/>
-              <a:t>7/6/2017</a:t>
+              <a:t>7/12/2017</a:t>
             </a:fld>
             <a:endParaRPr lang="en-US"/>
           </a:p>
@@ -3392,7 +3392,7 @@
             <a:fld id="{1D8BD707-D9CF-40AE-B4C6-C98DA3205C09}" type="datetimeFigureOut">
               <a:rPr lang="en-US" smtClean="0"/>
               <a:pPr/>
-              <a:t>7/6/2017</a:t>
+              <a:t>7/12/2017</a:t>
             </a:fld>
             <a:endParaRPr lang="en-US"/>
           </a:p>
@@ -3782,11 +3782,7 @@
           <a:p>
             <a:r>
               <a:rPr lang="en-US" dirty="0" smtClean="0"/>
-              <a:t>Machine </a:t>
-            </a:r>
-            <a:r>
-              <a:rPr lang="en-US" dirty="0" smtClean="0"/>
-              <a:t>Learning</a:t>
+              <a:t>Machine Learning</a:t>
             </a:r>
             <a:br>
               <a:rPr lang="en-US" dirty="0" smtClean="0"/>
@@ -3846,14 +3842,14 @@
               </a:rPr>
             </a:br>
             <a:r>
-              <a:rPr lang="en-US" sz="2400" dirty="0">
+              <a:rPr lang="en-US" sz="2400" smtClean="0">
                 <a:solidFill>
                   <a:schemeClr val="accent1">
                     <a:lumMod val="75000"/>
                   </a:schemeClr>
                 </a:solidFill>
               </a:rPr>
-              <a:t>Andrew </a:t>
+              <a:t>Created by Andrew </a:t>
             </a:r>
             <a:r>
               <a:rPr lang="en-US" sz="2400" dirty="0" err="1" smtClean="0">
@@ -6522,8 +6518,8 @@
           </a:fontRef>
         </p:style>
       </p:cxnSp>
-      <mc:AlternateContent xmlns:mc="http://schemas.openxmlformats.org/markup-compatibility/2006">
-        <mc:Choice xmlns:a14="http://schemas.microsoft.com/office/drawing/2010/main" Requires="a14">
+      <mc:AlternateContent xmlns:mc="http://schemas.openxmlformats.org/markup-compatibility/2006" xmlns:a14="http://schemas.microsoft.com/office/drawing/2010/main">
+        <mc:Choice Requires="a14">
           <p:sp>
             <p:nvSpPr>
               <p:cNvPr id="36" name="TextBox 35"/>
@@ -6610,6 +6606,7 @@
                 </a:endParaRPr>
               </a:p>
               <a:p>
+                <a:pPr/>
                 <a14:m>
                   <m:oMathPara xmlns:m="http://schemas.openxmlformats.org/officeDocument/2006/math">
                     <m:oMathParaPr>
@@ -6738,6 +6735,7 @@
                                 </a:rPr>
                               </m:ctrlPr>
                             </m:dPr>
+                            <m:e/>
                           </m:d>
                           <m:r>
                             <a:rPr lang="en-US" sz="2000" b="1" i="1" smtClean="0">
@@ -7359,7 +7357,7 @@
             </p:txBody>
           </p:sp>
         </mc:Choice>
-        <mc:Fallback>
+        <mc:Fallback xmlns="">
           <p:sp>
             <p:nvSpPr>
               <p:cNvPr id="36" name="TextBox 35"/>
@@ -7743,8 +7741,8 @@
           </a:p>
         </p:txBody>
       </p:sp>
-      <mc:AlternateContent xmlns:mc="http://schemas.openxmlformats.org/markup-compatibility/2006">
-        <mc:Choice xmlns:a14="http://schemas.microsoft.com/office/drawing/2010/main" Requires="a14">
+      <mc:AlternateContent xmlns:mc="http://schemas.openxmlformats.org/markup-compatibility/2006" xmlns:a14="http://schemas.microsoft.com/office/drawing/2010/main">
+        <mc:Choice Requires="a14">
           <p:sp>
             <p:nvSpPr>
               <p:cNvPr id="7" name="TextBox 6"/>
@@ -7906,7 +7904,7 @@
             </p:txBody>
           </p:sp>
         </mc:Choice>
-        <mc:Fallback>
+        <mc:Fallback xmlns="">
           <p:sp>
             <p:nvSpPr>
               <p:cNvPr id="7" name="TextBox 6"/>
@@ -8158,8 +8156,8 @@
           </a:p>
         </p:txBody>
       </p:sp>
-      <mc:AlternateContent xmlns:mc="http://schemas.openxmlformats.org/markup-compatibility/2006">
-        <mc:Choice xmlns:a14="http://schemas.microsoft.com/office/drawing/2010/main" Requires="a14">
+      <mc:AlternateContent xmlns:mc="http://schemas.openxmlformats.org/markup-compatibility/2006" xmlns:a14="http://schemas.microsoft.com/office/drawing/2010/main">
+        <mc:Choice Requires="a14">
           <p:sp>
             <p:nvSpPr>
               <p:cNvPr id="14" name="TextBox 13"/>
@@ -8234,7 +8232,7 @@
             </p:txBody>
           </p:sp>
         </mc:Choice>
-        <mc:Fallback>
+        <mc:Fallback xmlns="">
           <p:sp>
             <p:nvSpPr>
               <p:cNvPr id="14" name="TextBox 13"/>
@@ -9455,13 +9453,6 @@
               </a:rPr>
               <a:t>Feature Scaling</a:t>
             </a:r>
-            <a:endParaRPr lang="en-US" sz="2800" b="1" dirty="0" smtClean="0">
-              <a:solidFill>
-                <a:schemeClr val="accent6">
-                  <a:lumMod val="75000"/>
-                </a:schemeClr>
-              </a:solidFill>
-            </a:endParaRPr>
           </a:p>
         </p:txBody>
       </p:sp>
@@ -9629,17 +9620,7 @@
                   </a:schemeClr>
                 </a:solidFill>
               </a:rPr>
-              <a:t>(e.g., US Census) or </a:t>
-            </a:r>
-            <a:r>
-              <a:rPr lang="en-US" sz="2800" b="1" dirty="0" smtClean="0">
-                <a:solidFill>
-                  <a:schemeClr val="accent5">
-                    <a:lumMod val="75000"/>
-                  </a:schemeClr>
-                </a:solidFill>
-              </a:rPr>
-              <a:t>via an API service (e.g., NWS </a:t>
+              <a:t>(e.g., US Census) or via an API service (e.g., NWS </a:t>
             </a:r>
             <a:br>
               <a:rPr lang="en-US" sz="2800" b="1" dirty="0" smtClean="0">
@@ -11418,13 +11399,6 @@
               </a:rPr>
               <a:t>g</a:t>
             </a:r>
-            <a:endParaRPr lang="en-US" dirty="0">
-              <a:solidFill>
-                <a:schemeClr val="accent1">
-                  <a:lumMod val="75000"/>
-                </a:schemeClr>
-              </a:solidFill>
-            </a:endParaRPr>
           </a:p>
         </p:txBody>
       </p:sp>
@@ -11891,13 +11865,6 @@
               </a:rPr>
               <a:t>).</a:t>
             </a:r>
-            <a:endParaRPr lang="en-US" sz="2800" b="1" dirty="0" smtClean="0">
-              <a:solidFill>
-                <a:schemeClr val="accent5">
-                  <a:lumMod val="75000"/>
-                </a:schemeClr>
-              </a:solidFill>
-            </a:endParaRPr>
           </a:p>
           <a:p>
             <a:endParaRPr lang="en-US" sz="2400" b="1" dirty="0" smtClean="0">

</xml_diff>

<commit_message>
add lambda method of scaling
</commit_message>
<xml_diff>
--- a/Presentations/ML Dataset Preparation.pptx
+++ b/Presentations/ML Dataset Preparation.pptx
@@ -5,7 +5,7 @@
     <p:sldMasterId id="2147483648" r:id="rId1"/>
   </p:sldMasterIdLst>
   <p:notesMasterIdLst>
-    <p:notesMasterId r:id="rId18"/>
+    <p:notesMasterId r:id="rId19"/>
   </p:notesMasterIdLst>
   <p:sldIdLst>
     <p:sldId id="256" r:id="rId2"/>
@@ -24,6 +24,7 @@
     <p:sldId id="291" r:id="rId15"/>
     <p:sldId id="292" r:id="rId16"/>
     <p:sldId id="293" r:id="rId17"/>
+    <p:sldId id="294" r:id="rId18"/>
   </p:sldIdLst>
   <p:sldSz cx="9144000" cy="6858000" type="screen4x3"/>
   <p:notesSz cx="6858000" cy="9144000"/>
@@ -793,6 +794,90 @@
             <a:fld id="{33BCA7FF-732B-40A5-A357-78577D1E9137}" type="slidenum">
               <a:rPr lang="en-US" smtClean="0"/>
               <a:t>16</a:t>
+            </a:fld>
+            <a:endParaRPr lang="en-US"/>
+          </a:p>
+        </p:txBody>
+      </p:sp>
+    </p:spTree>
+    <p:extLst>
+      <p:ext uri="{BB962C8B-B14F-4D97-AF65-F5344CB8AC3E}">
+        <p14:creationId xmlns:p14="http://schemas.microsoft.com/office/powerpoint/2010/main" val="1775015703"/>
+      </p:ext>
+    </p:extLst>
+  </p:cSld>
+  <p:clrMapOvr>
+    <a:masterClrMapping/>
+  </p:clrMapOvr>
+</p:notes>
+</file>
+
+<file path=ppt/notesSlides/notesSlide5.xml><?xml version="1.0" encoding="utf-8"?>
+<p:notes xmlns:a="http://schemas.openxmlformats.org/drawingml/2006/main" xmlns:r="http://schemas.openxmlformats.org/officeDocument/2006/relationships" xmlns:p="http://schemas.openxmlformats.org/presentationml/2006/main">
+  <p:cSld>
+    <p:spTree>
+      <p:nvGrpSpPr>
+        <p:cNvPr id="1" name=""/>
+        <p:cNvGrpSpPr/>
+        <p:nvPr/>
+      </p:nvGrpSpPr>
+      <p:grpSpPr>
+        <a:xfrm>
+          <a:off x="0" y="0"/>
+          <a:ext cx="0" cy="0"/>
+          <a:chOff x="0" y="0"/>
+          <a:chExt cx="0" cy="0"/>
+        </a:xfrm>
+      </p:grpSpPr>
+      <p:sp>
+        <p:nvSpPr>
+          <p:cNvPr id="2" name="Slide Image Placeholder 1"/>
+          <p:cNvSpPr>
+            <a:spLocks noGrp="1" noRot="1" noChangeAspect="1"/>
+          </p:cNvSpPr>
+          <p:nvPr>
+            <p:ph type="sldImg"/>
+          </p:nvPr>
+        </p:nvSpPr>
+        <p:spPr/>
+      </p:sp>
+      <p:sp>
+        <p:nvSpPr>
+          <p:cNvPr id="3" name="Notes Placeholder 2"/>
+          <p:cNvSpPr>
+            <a:spLocks noGrp="1"/>
+          </p:cNvSpPr>
+          <p:nvPr>
+            <p:ph type="body" idx="1"/>
+          </p:nvPr>
+        </p:nvSpPr>
+        <p:spPr/>
+        <p:txBody>
+          <a:bodyPr/>
+          <a:lstStyle/>
+          <a:p>
+            <a:endParaRPr lang="en-US" dirty="0"/>
+          </a:p>
+        </p:txBody>
+      </p:sp>
+      <p:sp>
+        <p:nvSpPr>
+          <p:cNvPr id="4" name="Slide Number Placeholder 3"/>
+          <p:cNvSpPr>
+            <a:spLocks noGrp="1"/>
+          </p:cNvSpPr>
+          <p:nvPr>
+            <p:ph type="sldNum" sz="quarter" idx="10"/>
+          </p:nvPr>
+        </p:nvSpPr>
+        <p:spPr/>
+        <p:txBody>
+          <a:bodyPr/>
+          <a:lstStyle/>
+          <a:p>
+            <a:fld id="{33BCA7FF-732B-40A5-A357-78577D1E9137}" type="slidenum">
+              <a:rPr lang="en-US" smtClean="0"/>
+              <a:t>17</a:t>
             </a:fld>
             <a:endParaRPr lang="en-US"/>
           </a:p>
@@ -3832,17 +3917,7 @@
                   </a:schemeClr>
                 </a:solidFill>
               </a:rPr>
-              <a:t>Created </a:t>
-            </a:r>
-            <a:r>
-              <a:rPr lang="en-US" sz="2400" dirty="0" smtClean="0">
-                <a:solidFill>
-                  <a:schemeClr val="accent1">
-                    <a:lumMod val="75000"/>
-                  </a:schemeClr>
-                </a:solidFill>
-              </a:rPr>
-              <a:t>by Andrew </a:t>
+              <a:t>Created by Andrew </a:t>
             </a:r>
             <a:r>
               <a:rPr lang="en-US" sz="2400" dirty="0" err="1" smtClean="0">
@@ -8643,16 +8718,46 @@
           <a:p>
             <a:pPr algn="l"/>
             <a:r>
-              <a:rPr lang="en-US" dirty="0" smtClean="0">
+              <a:rPr lang="en-US" sz="3600" dirty="0" smtClean="0">
                 <a:solidFill>
                   <a:schemeClr val="accent1">
                     <a:lumMod val="75000"/>
                   </a:schemeClr>
                 </a:solidFill>
               </a:rPr>
-              <a:t>Feature Scaling in Python</a:t>
-            </a:r>
-            <a:endParaRPr lang="en-US" dirty="0">
+              <a:t>Feature Scaling in </a:t>
+            </a:r>
+            <a:r>
+              <a:rPr lang="en-US" sz="3600" dirty="0" smtClean="0">
+                <a:solidFill>
+                  <a:schemeClr val="accent1">
+                    <a:lumMod val="75000"/>
+                  </a:schemeClr>
+                </a:solidFill>
+              </a:rPr>
+              <a:t>Python using </a:t>
+            </a:r>
+            <a:r>
+              <a:rPr lang="en-US" sz="3600" dirty="0" err="1" smtClean="0">
+                <a:solidFill>
+                  <a:schemeClr val="accent1">
+                    <a:lumMod val="75000"/>
+                  </a:schemeClr>
+                </a:solidFill>
+              </a:rPr>
+              <a:t>Sci</a:t>
+            </a:r>
+            <a:r>
+              <a:rPr lang="en-US" sz="3600" dirty="0" smtClean="0">
+                <a:solidFill>
+                  <a:schemeClr val="accent1">
+                    <a:lumMod val="75000"/>
+                  </a:schemeClr>
+                </a:solidFill>
+              </a:rPr>
+              <a:t>-kit learn</a:t>
+            </a:r>
+            <a:endParaRPr lang="en-US" sz="3600" dirty="0">
               <a:solidFill>
                 <a:schemeClr val="accent1">
                   <a:lumMod val="75000"/>
@@ -9017,6 +9122,827 @@
     <p:extLst>
       <p:ext uri="{BB962C8B-B14F-4D97-AF65-F5344CB8AC3E}">
         <p14:creationId xmlns:p14="http://schemas.microsoft.com/office/powerpoint/2010/main" val="366572025"/>
+      </p:ext>
+    </p:extLst>
+  </p:cSld>
+  <p:clrMapOvr>
+    <a:masterClrMapping/>
+  </p:clrMapOvr>
+  <p:timing>
+    <p:tnLst>
+      <p:par>
+        <p:cTn id="1" dur="indefinite" restart="never" nodeType="tmRoot"/>
+      </p:par>
+    </p:tnLst>
+  </p:timing>
+</p:sld>
+</file>
+
+<file path=ppt/slides/slide17.xml><?xml version="1.0" encoding="utf-8"?>
+<p:sld xmlns:a="http://schemas.openxmlformats.org/drawingml/2006/main" xmlns:r="http://schemas.openxmlformats.org/officeDocument/2006/relationships" xmlns:p="http://schemas.openxmlformats.org/presentationml/2006/main">
+  <p:cSld>
+    <p:spTree>
+      <p:nvGrpSpPr>
+        <p:cNvPr id="1" name=""/>
+        <p:cNvGrpSpPr/>
+        <p:nvPr/>
+      </p:nvGrpSpPr>
+      <p:grpSpPr>
+        <a:xfrm>
+          <a:off x="0" y="0"/>
+          <a:ext cx="0" cy="0"/>
+          <a:chOff x="0" y="0"/>
+          <a:chExt cx="0" cy="0"/>
+        </a:xfrm>
+      </p:grpSpPr>
+      <p:sp>
+        <p:nvSpPr>
+          <p:cNvPr id="2" name="Title 1"/>
+          <p:cNvSpPr>
+            <a:spLocks noGrp="1"/>
+          </p:cNvSpPr>
+          <p:nvPr>
+            <p:ph type="title"/>
+          </p:nvPr>
+        </p:nvSpPr>
+        <p:spPr>
+          <a:xfrm>
+            <a:off x="114300" y="227013"/>
+            <a:ext cx="8915400" cy="792162"/>
+          </a:xfrm>
+        </p:spPr>
+        <p:txBody>
+          <a:bodyPr>
+            <a:normAutofit/>
+          </a:bodyPr>
+          <a:lstStyle/>
+          <a:p>
+            <a:pPr algn="l"/>
+            <a:r>
+              <a:rPr lang="en-US" sz="3200" dirty="0" smtClean="0">
+                <a:solidFill>
+                  <a:schemeClr val="accent1">
+                    <a:lumMod val="75000"/>
+                  </a:schemeClr>
+                </a:solidFill>
+              </a:rPr>
+              <a:t>Feature Scaling in </a:t>
+            </a:r>
+            <a:r>
+              <a:rPr lang="en-US" sz="3200" dirty="0" smtClean="0">
+                <a:solidFill>
+                  <a:schemeClr val="accent1">
+                    <a:lumMod val="75000"/>
+                  </a:schemeClr>
+                </a:solidFill>
+              </a:rPr>
+              <a:t>Python with Panda </a:t>
+            </a:r>
+            <a:r>
+              <a:rPr lang="en-US" sz="3200" dirty="0" err="1" smtClean="0">
+                <a:solidFill>
+                  <a:schemeClr val="accent1">
+                    <a:lumMod val="75000"/>
+                  </a:schemeClr>
+                </a:solidFill>
+              </a:rPr>
+              <a:t>Dataframe</a:t>
+            </a:r>
+            <a:endParaRPr lang="en-US" sz="3200" dirty="0">
+              <a:solidFill>
+                <a:schemeClr val="accent1">
+                  <a:lumMod val="75000"/>
+                </a:schemeClr>
+              </a:solidFill>
+            </a:endParaRPr>
+          </a:p>
+        </p:txBody>
+      </p:sp>
+      <p:cxnSp>
+        <p:nvCxnSpPr>
+          <p:cNvPr id="5" name="Straight Connector 4"/>
+          <p:cNvCxnSpPr/>
+          <p:nvPr/>
+        </p:nvCxnSpPr>
+        <p:spPr>
+          <a:xfrm>
+            <a:off x="0" y="990600"/>
+            <a:ext cx="9144000" cy="0"/>
+          </a:xfrm>
+          <a:prstGeom prst="line">
+            <a:avLst/>
+          </a:prstGeom>
+          <a:ln w="19050"/>
+        </p:spPr>
+        <p:style>
+          <a:lnRef idx="1">
+            <a:schemeClr val="accent1"/>
+          </a:lnRef>
+          <a:fillRef idx="0">
+            <a:schemeClr val="accent1"/>
+          </a:fillRef>
+          <a:effectRef idx="0">
+            <a:schemeClr val="accent1"/>
+          </a:effectRef>
+          <a:fontRef idx="minor">
+            <a:schemeClr val="tx1"/>
+          </a:fontRef>
+        </p:style>
+      </p:cxnSp>
+      <p:sp>
+        <p:nvSpPr>
+          <p:cNvPr id="9" name="TextBox 8"/>
+          <p:cNvSpPr txBox="1"/>
+          <p:nvPr/>
+        </p:nvSpPr>
+        <p:spPr>
+          <a:xfrm>
+            <a:off x="762000" y="1532036"/>
+            <a:ext cx="7091685" cy="4247317"/>
+          </a:xfrm>
+          <a:prstGeom prst="rect">
+            <a:avLst/>
+          </a:prstGeom>
+          <a:noFill/>
+        </p:spPr>
+        <p:txBody>
+          <a:bodyPr wrap="none" rtlCol="0">
+            <a:spAutoFit/>
+          </a:bodyPr>
+          <a:lstStyle/>
+          <a:p>
+            <a:r>
+              <a:rPr lang="en-US" dirty="0" smtClean="0">
+                <a:solidFill>
+                  <a:srgbClr val="0070C0"/>
+                </a:solidFill>
+              </a:rPr>
+              <a:t>import </a:t>
+            </a:r>
+            <a:r>
+              <a:rPr lang="en-US" dirty="0" err="1" smtClean="0"/>
+              <a:t>numpy</a:t>
+            </a:r>
+            <a:r>
+              <a:rPr lang="en-US" dirty="0" smtClean="0"/>
+              <a:t> </a:t>
+            </a:r>
+            <a:r>
+              <a:rPr lang="en-US" dirty="0" smtClean="0">
+                <a:solidFill>
+                  <a:schemeClr val="accent5">
+                    <a:lumMod val="75000"/>
+                  </a:schemeClr>
+                </a:solidFill>
+              </a:rPr>
+              <a:t>as</a:t>
+            </a:r>
+            <a:r>
+              <a:rPr lang="en-US" dirty="0" smtClean="0"/>
+              <a:t> np	</a:t>
+            </a:r>
+            <a:r>
+              <a:rPr lang="en-US" dirty="0" smtClean="0">
+                <a:solidFill>
+                  <a:srgbClr val="00B050"/>
+                </a:solidFill>
+              </a:rPr>
+              <a:t># </a:t>
+            </a:r>
+            <a:r>
+              <a:rPr lang="en-US" dirty="0" err="1" smtClean="0">
+                <a:solidFill>
+                  <a:srgbClr val="00B050"/>
+                </a:solidFill>
+              </a:rPr>
+              <a:t>numpy</a:t>
+            </a:r>
+            <a:r>
+              <a:rPr lang="en-US" dirty="0" smtClean="0">
+                <a:solidFill>
+                  <a:srgbClr val="00B050"/>
+                </a:solidFill>
+              </a:rPr>
+              <a:t> module for arrays</a:t>
+            </a:r>
+          </a:p>
+          <a:p>
+            <a:r>
+              <a:rPr lang="en-US" dirty="0" smtClean="0">
+                <a:solidFill>
+                  <a:srgbClr val="0070C0"/>
+                </a:solidFill>
+              </a:rPr>
+              <a:t>import</a:t>
+            </a:r>
+            <a:r>
+              <a:rPr lang="en-US" dirty="0" smtClean="0"/>
+              <a:t> pandas </a:t>
+            </a:r>
+            <a:r>
+              <a:rPr lang="en-US" dirty="0" smtClean="0">
+                <a:solidFill>
+                  <a:schemeClr val="accent5">
+                    <a:lumMod val="75000"/>
+                  </a:schemeClr>
+                </a:solidFill>
+              </a:rPr>
+              <a:t>as</a:t>
+            </a:r>
+            <a:r>
+              <a:rPr lang="en-US" dirty="0" smtClean="0"/>
+              <a:t> </a:t>
+            </a:r>
+            <a:r>
+              <a:rPr lang="en-US" dirty="0" err="1" smtClean="0"/>
+              <a:t>pd</a:t>
+            </a:r>
+            <a:r>
+              <a:rPr lang="en-US" dirty="0" smtClean="0"/>
+              <a:t>	</a:t>
+            </a:r>
+            <a:r>
+              <a:rPr lang="en-US" dirty="0" smtClean="0">
+                <a:solidFill>
+                  <a:srgbClr val="00B050"/>
+                </a:solidFill>
+              </a:rPr>
+              <a:t># </a:t>
+            </a:r>
+            <a:r>
+              <a:rPr lang="en-US" dirty="0" smtClean="0">
+                <a:solidFill>
+                  <a:srgbClr val="00B050"/>
+                </a:solidFill>
+              </a:rPr>
+              <a:t>pandas module for data frames</a:t>
+            </a:r>
+            <a:endParaRPr lang="en-US" dirty="0" smtClean="0">
+              <a:solidFill>
+                <a:srgbClr val="00B050"/>
+              </a:solidFill>
+            </a:endParaRPr>
+          </a:p>
+          <a:p>
+            <a:endParaRPr lang="en-US" dirty="0" smtClean="0"/>
+          </a:p>
+          <a:p>
+            <a:r>
+              <a:rPr lang="en-US" dirty="0" smtClean="0">
+                <a:solidFill>
+                  <a:srgbClr val="00B050"/>
+                </a:solidFill>
+              </a:rPr>
+              <a:t># </a:t>
+            </a:r>
+            <a:r>
+              <a:rPr lang="en-US" dirty="0" smtClean="0">
+                <a:solidFill>
+                  <a:srgbClr val="00B050"/>
+                </a:solidFill>
+              </a:rPr>
+              <a:t>Read a CSV file into a data frame</a:t>
+            </a:r>
+            <a:endParaRPr lang="en-US" dirty="0" smtClean="0">
+              <a:solidFill>
+                <a:srgbClr val="00B050"/>
+              </a:solidFill>
+            </a:endParaRPr>
+          </a:p>
+          <a:p>
+            <a:r>
+              <a:rPr lang="en-US" dirty="0" err="1" smtClean="0"/>
+              <a:t>Df</a:t>
+            </a:r>
+            <a:r>
+              <a:rPr lang="en-US" dirty="0" smtClean="0"/>
+              <a:t> = </a:t>
+            </a:r>
+            <a:r>
+              <a:rPr lang="en-US" dirty="0" err="1" smtClean="0"/>
+              <a:t>pd.read_csv</a:t>
+            </a:r>
+            <a:r>
+              <a:rPr lang="en-US" dirty="0" smtClean="0"/>
+              <a:t>(‘data.csv’)</a:t>
+            </a:r>
+            <a:endParaRPr lang="en-US" dirty="0" smtClean="0"/>
+          </a:p>
+          <a:p>
+            <a:r>
+              <a:rPr lang="en-US" dirty="0" smtClean="0"/>
+              <a:t/>
+            </a:r>
+            <a:br>
+              <a:rPr lang="en-US" dirty="0" smtClean="0"/>
+            </a:br>
+            <a:r>
+              <a:rPr lang="en-US" dirty="0" smtClean="0">
+                <a:solidFill>
+                  <a:srgbClr val="00B050"/>
+                </a:solidFill>
+              </a:rPr>
+              <a:t># </a:t>
+            </a:r>
+            <a:r>
+              <a:rPr lang="en-US" dirty="0" smtClean="0">
+                <a:solidFill>
+                  <a:srgbClr val="00B050"/>
+                </a:solidFill>
+              </a:rPr>
+              <a:t>Use </a:t>
+            </a:r>
+            <a:r>
+              <a:rPr lang="en-US" dirty="0" err="1" smtClean="0">
+                <a:solidFill>
+                  <a:srgbClr val="00B050"/>
+                </a:solidFill>
+              </a:rPr>
+              <a:t>lamda</a:t>
+            </a:r>
+            <a:r>
+              <a:rPr lang="en-US" dirty="0" smtClean="0">
+                <a:solidFill>
+                  <a:srgbClr val="00B050"/>
+                </a:solidFill>
+              </a:rPr>
+              <a:t> expression to iteratively scale eac</a:t>
+            </a:r>
+            <a:r>
+              <a:rPr lang="en-US" dirty="0" smtClean="0">
+                <a:solidFill>
+                  <a:srgbClr val="00B050"/>
+                </a:solidFill>
+              </a:rPr>
+              <a:t>h column</a:t>
+            </a:r>
+            <a:endParaRPr lang="en-US" dirty="0" smtClean="0">
+              <a:solidFill>
+                <a:srgbClr val="00B050"/>
+              </a:solidFill>
+            </a:endParaRPr>
+          </a:p>
+          <a:p>
+            <a:r>
+              <a:rPr lang="en-US" dirty="0" err="1"/>
+              <a:t>df.apply</a:t>
+            </a:r>
+            <a:r>
+              <a:rPr lang="en-US" dirty="0"/>
+              <a:t>(lambda x: (x - </a:t>
+            </a:r>
+            <a:r>
+              <a:rPr lang="en-US" dirty="0" err="1" smtClean="0"/>
+              <a:t>np.min</a:t>
+            </a:r>
+            <a:r>
+              <a:rPr lang="en-US" dirty="0" smtClean="0"/>
+              <a:t>(x</a:t>
+            </a:r>
+            <a:r>
+              <a:rPr lang="en-US" dirty="0"/>
+              <a:t>)) / (</a:t>
+            </a:r>
+            <a:r>
+              <a:rPr lang="en-US" dirty="0" err="1"/>
+              <a:t>np.max</a:t>
+            </a:r>
+            <a:r>
+              <a:rPr lang="en-US" dirty="0"/>
+              <a:t>(x) - </a:t>
+            </a:r>
+            <a:r>
+              <a:rPr lang="en-US" dirty="0" err="1"/>
+              <a:t>np.min</a:t>
+            </a:r>
+            <a:r>
+              <a:rPr lang="en-US" dirty="0"/>
+              <a:t>(x)))</a:t>
+            </a:r>
+            <a:endParaRPr lang="en-US" dirty="0"/>
+          </a:p>
+          <a:p>
+            <a:endParaRPr lang="en-US" dirty="0" smtClean="0"/>
+          </a:p>
+          <a:p>
+            <a:endParaRPr lang="en-US" dirty="0" smtClean="0"/>
+          </a:p>
+          <a:p>
+            <a:endParaRPr lang="en-US" dirty="0"/>
+          </a:p>
+          <a:p>
+            <a:r>
+              <a:rPr lang="en-US" dirty="0"/>
+              <a:t/>
+            </a:r>
+            <a:br>
+              <a:rPr lang="en-US" dirty="0"/>
+            </a:br>
+            <a:r>
+              <a:rPr lang="en-US" dirty="0">
+                <a:solidFill>
+                  <a:srgbClr val="00B050"/>
+                </a:solidFill>
+              </a:rPr>
+              <a:t># Use </a:t>
+            </a:r>
+            <a:r>
+              <a:rPr lang="en-US" dirty="0" err="1">
+                <a:solidFill>
+                  <a:srgbClr val="00B050"/>
+                </a:solidFill>
+              </a:rPr>
+              <a:t>lamda</a:t>
+            </a:r>
+            <a:r>
+              <a:rPr lang="en-US" dirty="0">
+                <a:solidFill>
+                  <a:srgbClr val="00B050"/>
+                </a:solidFill>
+              </a:rPr>
+              <a:t> expression to iteratively scale each </a:t>
+            </a:r>
+            <a:r>
+              <a:rPr lang="en-US" dirty="0" smtClean="0">
+                <a:solidFill>
+                  <a:srgbClr val="00B050"/>
+                </a:solidFill>
+              </a:rPr>
+              <a:t>value in a specific column</a:t>
+            </a:r>
+            <a:endParaRPr lang="en-US" dirty="0">
+              <a:solidFill>
+                <a:srgbClr val="00B050"/>
+              </a:solidFill>
+            </a:endParaRPr>
+          </a:p>
+          <a:p>
+            <a:r>
+              <a:rPr lang="en-US" dirty="0" err="1" smtClean="0"/>
+              <a:t>df</a:t>
+            </a:r>
+            <a:r>
+              <a:rPr lang="en-US" dirty="0" smtClean="0"/>
+              <a:t>[‘income’].apply(lambda </a:t>
+            </a:r>
+            <a:r>
+              <a:rPr lang="en-US" dirty="0"/>
+              <a:t>x: (x - </a:t>
+            </a:r>
+            <a:r>
+              <a:rPr lang="en-US" dirty="0" err="1"/>
+              <a:t>np.min</a:t>
+            </a:r>
+            <a:r>
+              <a:rPr lang="en-US" dirty="0"/>
+              <a:t>(x)) / (</a:t>
+            </a:r>
+            <a:r>
+              <a:rPr lang="en-US" dirty="0" err="1"/>
+              <a:t>np.max</a:t>
+            </a:r>
+            <a:r>
+              <a:rPr lang="en-US" dirty="0"/>
+              <a:t>(x) - </a:t>
+            </a:r>
+            <a:r>
+              <a:rPr lang="en-US" dirty="0" err="1"/>
+              <a:t>np.min</a:t>
+            </a:r>
+            <a:r>
+              <a:rPr lang="en-US" dirty="0"/>
+              <a:t>(x)))</a:t>
+            </a:r>
+          </a:p>
+          <a:p>
+            <a:endParaRPr lang="en-US" dirty="0" smtClean="0"/>
+          </a:p>
+        </p:txBody>
+      </p:sp>
+      <p:sp>
+        <p:nvSpPr>
+          <p:cNvPr id="12" name="TextBox 11"/>
+          <p:cNvSpPr txBox="1"/>
+          <p:nvPr/>
+        </p:nvSpPr>
+        <p:spPr>
+          <a:xfrm>
+            <a:off x="2583011" y="4394358"/>
+            <a:ext cx="2415918" cy="307777"/>
+          </a:xfrm>
+          <a:prstGeom prst="rect">
+            <a:avLst/>
+          </a:prstGeom>
+          <a:noFill/>
+        </p:spPr>
+        <p:txBody>
+          <a:bodyPr wrap="none" rtlCol="0">
+            <a:spAutoFit/>
+          </a:bodyPr>
+          <a:lstStyle/>
+          <a:p>
+            <a:r>
+              <a:rPr lang="en-US" sz="1400" i="1" dirty="0" smtClean="0">
+                <a:solidFill>
+                  <a:srgbClr val="00B050"/>
+                </a:solidFill>
+              </a:rPr>
+              <a:t>x</a:t>
+            </a:r>
+            <a:r>
+              <a:rPr lang="en-US" sz="1400" dirty="0" smtClean="0">
+                <a:solidFill>
+                  <a:srgbClr val="00B050"/>
+                </a:solidFill>
+              </a:rPr>
+              <a:t> represents a column (vector)</a:t>
+            </a:r>
+            <a:endParaRPr lang="en-US" sz="1400" dirty="0">
+              <a:solidFill>
+                <a:srgbClr val="00B050"/>
+              </a:solidFill>
+            </a:endParaRPr>
+          </a:p>
+        </p:txBody>
+      </p:sp>
+      <p:cxnSp>
+        <p:nvCxnSpPr>
+          <p:cNvPr id="13" name="Curved Connector 12"/>
+          <p:cNvCxnSpPr/>
+          <p:nvPr/>
+        </p:nvCxnSpPr>
+        <p:spPr>
+          <a:xfrm rot="16200000" flipV="1">
+            <a:off x="2279770" y="3946266"/>
+            <a:ext cx="606482" cy="333950"/>
+          </a:xfrm>
+          <a:prstGeom prst="curvedConnector3">
+            <a:avLst/>
+          </a:prstGeom>
+          <a:ln>
+            <a:solidFill>
+              <a:srgbClr val="00B050"/>
+            </a:solidFill>
+            <a:tailEnd type="arrow"/>
+          </a:ln>
+        </p:spPr>
+        <p:style>
+          <a:lnRef idx="1">
+            <a:schemeClr val="accent1"/>
+          </a:lnRef>
+          <a:fillRef idx="0">
+            <a:schemeClr val="accent1"/>
+          </a:fillRef>
+          <a:effectRef idx="0">
+            <a:schemeClr val="accent1"/>
+          </a:effectRef>
+          <a:fontRef idx="minor">
+            <a:schemeClr val="tx1"/>
+          </a:fontRef>
+        </p:style>
+      </p:cxnSp>
+      <p:cxnSp>
+        <p:nvCxnSpPr>
+          <p:cNvPr id="15" name="Curved Connector 14"/>
+          <p:cNvCxnSpPr/>
+          <p:nvPr/>
+        </p:nvCxnSpPr>
+        <p:spPr>
+          <a:xfrm rot="5400000" flipH="1" flipV="1">
+            <a:off x="2469567" y="4075776"/>
+            <a:ext cx="637164" cy="1"/>
+          </a:xfrm>
+          <a:prstGeom prst="curvedConnector3">
+            <a:avLst/>
+          </a:prstGeom>
+          <a:ln>
+            <a:solidFill>
+              <a:srgbClr val="00B050"/>
+            </a:solidFill>
+            <a:tailEnd type="arrow"/>
+          </a:ln>
+        </p:spPr>
+        <p:style>
+          <a:lnRef idx="1">
+            <a:schemeClr val="accent1"/>
+          </a:lnRef>
+          <a:fillRef idx="0">
+            <a:schemeClr val="accent1"/>
+          </a:fillRef>
+          <a:effectRef idx="0">
+            <a:schemeClr val="accent1"/>
+          </a:effectRef>
+          <a:fontRef idx="minor">
+            <a:schemeClr val="tx1"/>
+          </a:fontRef>
+        </p:style>
+      </p:cxnSp>
+      <p:cxnSp>
+        <p:nvCxnSpPr>
+          <p:cNvPr id="18" name="Curved Connector 17"/>
+          <p:cNvCxnSpPr/>
+          <p:nvPr/>
+        </p:nvCxnSpPr>
+        <p:spPr>
+          <a:xfrm flipV="1">
+            <a:off x="2788150" y="3757194"/>
+            <a:ext cx="1011486" cy="637165"/>
+          </a:xfrm>
+          <a:prstGeom prst="curvedConnector3">
+            <a:avLst>
+              <a:gd name="adj1" fmla="val 96659"/>
+            </a:avLst>
+          </a:prstGeom>
+          <a:ln>
+            <a:solidFill>
+              <a:srgbClr val="00B050"/>
+            </a:solidFill>
+            <a:tailEnd type="arrow"/>
+          </a:ln>
+        </p:spPr>
+        <p:style>
+          <a:lnRef idx="1">
+            <a:schemeClr val="accent1"/>
+          </a:lnRef>
+          <a:fillRef idx="0">
+            <a:schemeClr val="accent1"/>
+          </a:fillRef>
+          <a:effectRef idx="0">
+            <a:schemeClr val="accent1"/>
+          </a:effectRef>
+          <a:fontRef idx="minor">
+            <a:schemeClr val="tx1"/>
+          </a:fontRef>
+        </p:style>
+      </p:cxnSp>
+      <p:sp>
+        <p:nvSpPr>
+          <p:cNvPr id="20" name="TextBox 19"/>
+          <p:cNvSpPr txBox="1"/>
+          <p:nvPr/>
+        </p:nvSpPr>
+        <p:spPr>
+          <a:xfrm>
+            <a:off x="2591677" y="6172200"/>
+            <a:ext cx="3096553" cy="307777"/>
+          </a:xfrm>
+          <a:prstGeom prst="rect">
+            <a:avLst/>
+          </a:prstGeom>
+          <a:noFill/>
+        </p:spPr>
+        <p:txBody>
+          <a:bodyPr wrap="none" rtlCol="0">
+            <a:spAutoFit/>
+          </a:bodyPr>
+          <a:lstStyle/>
+          <a:p>
+            <a:r>
+              <a:rPr lang="en-US" sz="1400" i="1" dirty="0" smtClean="0">
+                <a:solidFill>
+                  <a:srgbClr val="00B050"/>
+                </a:solidFill>
+              </a:rPr>
+              <a:t>x</a:t>
+            </a:r>
+            <a:r>
+              <a:rPr lang="en-US" sz="1400" dirty="0" smtClean="0">
+                <a:solidFill>
+                  <a:srgbClr val="00B050"/>
+                </a:solidFill>
+              </a:rPr>
+              <a:t> represents a value in a column </a:t>
+            </a:r>
+            <a:r>
+              <a:rPr lang="en-US" sz="1400" smtClean="0">
+                <a:solidFill>
+                  <a:srgbClr val="00B050"/>
+                </a:solidFill>
+              </a:rPr>
+              <a:t>(scalar)</a:t>
+            </a:r>
+            <a:endParaRPr lang="en-US" sz="1400" dirty="0">
+              <a:solidFill>
+                <a:srgbClr val="00B050"/>
+              </a:solidFill>
+            </a:endParaRPr>
+          </a:p>
+        </p:txBody>
+      </p:sp>
+      <p:cxnSp>
+        <p:nvCxnSpPr>
+          <p:cNvPr id="21" name="Curved Connector 20"/>
+          <p:cNvCxnSpPr/>
+          <p:nvPr/>
+        </p:nvCxnSpPr>
+        <p:spPr>
+          <a:xfrm rot="16200000" flipV="1">
+            <a:off x="3258823" y="5649842"/>
+            <a:ext cx="606482" cy="333950"/>
+          </a:xfrm>
+          <a:prstGeom prst="curvedConnector3">
+            <a:avLst/>
+          </a:prstGeom>
+          <a:ln>
+            <a:solidFill>
+              <a:srgbClr val="00B050"/>
+            </a:solidFill>
+            <a:tailEnd type="arrow"/>
+          </a:ln>
+        </p:spPr>
+        <p:style>
+          <a:lnRef idx="1">
+            <a:schemeClr val="accent1"/>
+          </a:lnRef>
+          <a:fillRef idx="0">
+            <a:schemeClr val="accent1"/>
+          </a:fillRef>
+          <a:effectRef idx="0">
+            <a:schemeClr val="accent1"/>
+          </a:effectRef>
+          <a:fontRef idx="minor">
+            <a:schemeClr val="tx1"/>
+          </a:fontRef>
+        </p:style>
+      </p:cxnSp>
+      <p:cxnSp>
+        <p:nvCxnSpPr>
+          <p:cNvPr id="22" name="Curved Connector 21"/>
+          <p:cNvCxnSpPr/>
+          <p:nvPr/>
+        </p:nvCxnSpPr>
+        <p:spPr>
+          <a:xfrm rot="5400000" flipH="1" flipV="1">
+            <a:off x="3448620" y="5779352"/>
+            <a:ext cx="637164" cy="1"/>
+          </a:xfrm>
+          <a:prstGeom prst="curvedConnector3">
+            <a:avLst/>
+          </a:prstGeom>
+          <a:ln>
+            <a:solidFill>
+              <a:srgbClr val="00B050"/>
+            </a:solidFill>
+            <a:tailEnd type="arrow"/>
+          </a:ln>
+        </p:spPr>
+        <p:style>
+          <a:lnRef idx="1">
+            <a:schemeClr val="accent1"/>
+          </a:lnRef>
+          <a:fillRef idx="0">
+            <a:schemeClr val="accent1"/>
+          </a:fillRef>
+          <a:effectRef idx="0">
+            <a:schemeClr val="accent1"/>
+          </a:effectRef>
+          <a:fontRef idx="minor">
+            <a:schemeClr val="tx1"/>
+          </a:fontRef>
+        </p:style>
+      </p:cxnSp>
+      <p:cxnSp>
+        <p:nvCxnSpPr>
+          <p:cNvPr id="23" name="Curved Connector 22"/>
+          <p:cNvCxnSpPr/>
+          <p:nvPr/>
+        </p:nvCxnSpPr>
+        <p:spPr>
+          <a:xfrm flipV="1">
+            <a:off x="3767203" y="5460770"/>
+            <a:ext cx="1011486" cy="637165"/>
+          </a:xfrm>
+          <a:prstGeom prst="curvedConnector3">
+            <a:avLst>
+              <a:gd name="adj1" fmla="val 96659"/>
+            </a:avLst>
+          </a:prstGeom>
+          <a:ln>
+            <a:solidFill>
+              <a:srgbClr val="00B050"/>
+            </a:solidFill>
+            <a:tailEnd type="arrow"/>
+          </a:ln>
+        </p:spPr>
+        <p:style>
+          <a:lnRef idx="1">
+            <a:schemeClr val="accent1"/>
+          </a:lnRef>
+          <a:fillRef idx="0">
+            <a:schemeClr val="accent1"/>
+          </a:fillRef>
+          <a:effectRef idx="0">
+            <a:schemeClr val="accent1"/>
+          </a:effectRef>
+          <a:fontRef idx="minor">
+            <a:schemeClr val="tx1"/>
+          </a:fontRef>
+        </p:style>
+      </p:cxnSp>
+    </p:spTree>
+    <p:extLst>
+      <p:ext uri="{BB962C8B-B14F-4D97-AF65-F5344CB8AC3E}">
+        <p14:creationId xmlns:p14="http://schemas.microsoft.com/office/powerpoint/2010/main" val="418560200"/>
       </p:ext>
     </p:extLst>
   </p:cSld>

</xml_diff>